<commit_message>
more progress on slides , changing input data more systematically
</commit_message>
<xml_diff>
--- a/imgs/presentation_images.pptx
+++ b/imgs/presentation_images.pptx
@@ -12,6 +12,8 @@
     <p:sldId id="261" r:id="rId6"/>
     <p:sldId id="259" r:id="rId7"/>
     <p:sldId id="262" r:id="rId8"/>
+    <p:sldId id="263" r:id="rId9"/>
+    <p:sldId id="264" r:id="rId10"/>
   </p:sldIdLst>
   <p:sldSz cx="12192000" cy="6858000"/>
   <p:notesSz cx="6858000" cy="9144000"/>
@@ -4969,7 +4971,7 @@
           <a:p>
             <a:fld id="{A9FF6418-F1A0-3A46-AC92-4266E892B994}" type="datetimeFigureOut">
               <a:rPr lang="en-US" smtClean="0"/>
-              <a:t>1/25/23</a:t>
+              <a:t>1/26/23</a:t>
             </a:fld>
             <a:endParaRPr lang="en-US"/>
           </a:p>
@@ -5167,7 +5169,7 @@
           <a:p>
             <a:fld id="{A9FF6418-F1A0-3A46-AC92-4266E892B994}" type="datetimeFigureOut">
               <a:rPr lang="en-US" smtClean="0"/>
-              <a:t>1/25/23</a:t>
+              <a:t>1/26/23</a:t>
             </a:fld>
             <a:endParaRPr lang="en-US"/>
           </a:p>
@@ -5375,7 +5377,7 @@
           <a:p>
             <a:fld id="{A9FF6418-F1A0-3A46-AC92-4266E892B994}" type="datetimeFigureOut">
               <a:rPr lang="en-US" smtClean="0"/>
-              <a:t>1/25/23</a:t>
+              <a:t>1/26/23</a:t>
             </a:fld>
             <a:endParaRPr lang="en-US"/>
           </a:p>
@@ -5573,7 +5575,7 @@
           <a:p>
             <a:fld id="{A9FF6418-F1A0-3A46-AC92-4266E892B994}" type="datetimeFigureOut">
               <a:rPr lang="en-US" smtClean="0"/>
-              <a:t>1/25/23</a:t>
+              <a:t>1/26/23</a:t>
             </a:fld>
             <a:endParaRPr lang="en-US"/>
           </a:p>
@@ -5848,7 +5850,7 @@
           <a:p>
             <a:fld id="{A9FF6418-F1A0-3A46-AC92-4266E892B994}" type="datetimeFigureOut">
               <a:rPr lang="en-US" smtClean="0"/>
-              <a:t>1/25/23</a:t>
+              <a:t>1/26/23</a:t>
             </a:fld>
             <a:endParaRPr lang="en-US"/>
           </a:p>
@@ -6113,7 +6115,7 @@
           <a:p>
             <a:fld id="{A9FF6418-F1A0-3A46-AC92-4266E892B994}" type="datetimeFigureOut">
               <a:rPr lang="en-US" smtClean="0"/>
-              <a:t>1/25/23</a:t>
+              <a:t>1/26/23</a:t>
             </a:fld>
             <a:endParaRPr lang="en-US"/>
           </a:p>
@@ -6525,7 +6527,7 @@
           <a:p>
             <a:fld id="{A9FF6418-F1A0-3A46-AC92-4266E892B994}" type="datetimeFigureOut">
               <a:rPr lang="en-US" smtClean="0"/>
-              <a:t>1/25/23</a:t>
+              <a:t>1/26/23</a:t>
             </a:fld>
             <a:endParaRPr lang="en-US"/>
           </a:p>
@@ -6666,7 +6668,7 @@
           <a:p>
             <a:fld id="{A9FF6418-F1A0-3A46-AC92-4266E892B994}" type="datetimeFigureOut">
               <a:rPr lang="en-US" smtClean="0"/>
-              <a:t>1/25/23</a:t>
+              <a:t>1/26/23</a:t>
             </a:fld>
             <a:endParaRPr lang="en-US"/>
           </a:p>
@@ -6779,7 +6781,7 @@
           <a:p>
             <a:fld id="{A9FF6418-F1A0-3A46-AC92-4266E892B994}" type="datetimeFigureOut">
               <a:rPr lang="en-US" smtClean="0"/>
-              <a:t>1/25/23</a:t>
+              <a:t>1/26/23</a:t>
             </a:fld>
             <a:endParaRPr lang="en-US"/>
           </a:p>
@@ -7090,7 +7092,7 @@
           <a:p>
             <a:fld id="{A9FF6418-F1A0-3A46-AC92-4266E892B994}" type="datetimeFigureOut">
               <a:rPr lang="en-US" smtClean="0"/>
-              <a:t>1/25/23</a:t>
+              <a:t>1/26/23</a:t>
             </a:fld>
             <a:endParaRPr lang="en-US"/>
           </a:p>
@@ -7378,7 +7380,7 @@
           <a:p>
             <a:fld id="{A9FF6418-F1A0-3A46-AC92-4266E892B994}" type="datetimeFigureOut">
               <a:rPr lang="en-US" smtClean="0"/>
-              <a:t>1/25/23</a:t>
+              <a:t>1/26/23</a:t>
             </a:fld>
             <a:endParaRPr lang="en-US"/>
           </a:p>
@@ -7619,7 +7621,7 @@
           <a:p>
             <a:fld id="{A9FF6418-F1A0-3A46-AC92-4266E892B994}" type="datetimeFigureOut">
               <a:rPr lang="en-US" smtClean="0"/>
-              <a:t>1/25/23</a:t>
+              <a:t>1/26/23</a:t>
             </a:fld>
             <a:endParaRPr lang="en-US"/>
           </a:p>
@@ -14084,6 +14086,1835 @@
 </p:sld>
 </file>
 
+<file path=ppt/slides/slide8.xml><?xml version="1.0" encoding="utf-8"?>
+<p:sld xmlns:a="http://schemas.openxmlformats.org/drawingml/2006/main" xmlns:r="http://schemas.openxmlformats.org/officeDocument/2006/relationships" xmlns:p="http://schemas.openxmlformats.org/presentationml/2006/main">
+  <p:cSld>
+    <p:spTree>
+      <p:nvGrpSpPr>
+        <p:cNvPr id="1" name=""/>
+        <p:cNvGrpSpPr/>
+        <p:nvPr/>
+      </p:nvGrpSpPr>
+      <p:grpSpPr>
+        <a:xfrm>
+          <a:off x="0" y="0"/>
+          <a:ext cx="0" cy="0"/>
+          <a:chOff x="0" y="0"/>
+          <a:chExt cx="0" cy="0"/>
+        </a:xfrm>
+      </p:grpSpPr>
+      <p:graphicFrame>
+        <p:nvGraphicFramePr>
+          <p:cNvPr id="8" name="Table 4">
+            <a:extLst>
+              <a:ext uri="{FF2B5EF4-FFF2-40B4-BE49-F238E27FC236}">
+                <a16:creationId xmlns:a16="http://schemas.microsoft.com/office/drawing/2014/main" id="{9B920787-7288-7827-CDE7-633C71CC219D}"/>
+              </a:ext>
+            </a:extLst>
+          </p:cNvPr>
+          <p:cNvGraphicFramePr>
+            <a:graphicFrameLocks noGrp="1"/>
+          </p:cNvGraphicFramePr>
+          <p:nvPr>
+            <p:extLst>
+              <p:ext uri="{D42A27DB-BD31-4B8C-83A1-F6EECF244321}">
+                <p14:modId xmlns:p14="http://schemas.microsoft.com/office/powerpoint/2010/main" val="2622236449"/>
+              </p:ext>
+            </p:extLst>
+          </p:nvPr>
+        </p:nvGraphicFramePr>
+        <p:xfrm>
+          <a:off x="726139" y="2146858"/>
+          <a:ext cx="4779618" cy="2160494"/>
+        </p:xfrm>
+        <a:graphic>
+          <a:graphicData uri="http://schemas.openxmlformats.org/drawingml/2006/table">
+            <a:tbl>
+              <a:tblPr firstRow="1" bandRow="1">
+                <a:tableStyleId>{5C22544A-7EE6-4342-B048-85BDC9FD1C3A}</a:tableStyleId>
+              </a:tblPr>
+              <a:tblGrid>
+                <a:gridCol w="796603">
+                  <a:extLst>
+                    <a:ext uri="{9D8B030D-6E8A-4147-A177-3AD203B41FA5}">
+                      <a16:colId xmlns:a16="http://schemas.microsoft.com/office/drawing/2014/main" val="2997985592"/>
+                    </a:ext>
+                  </a:extLst>
+                </a:gridCol>
+                <a:gridCol w="796603">
+                  <a:extLst>
+                    <a:ext uri="{9D8B030D-6E8A-4147-A177-3AD203B41FA5}">
+                      <a16:colId xmlns:a16="http://schemas.microsoft.com/office/drawing/2014/main" val="4138932228"/>
+                    </a:ext>
+                  </a:extLst>
+                </a:gridCol>
+                <a:gridCol w="796603">
+                  <a:extLst>
+                    <a:ext uri="{9D8B030D-6E8A-4147-A177-3AD203B41FA5}">
+                      <a16:colId xmlns:a16="http://schemas.microsoft.com/office/drawing/2014/main" val="370515256"/>
+                    </a:ext>
+                  </a:extLst>
+                </a:gridCol>
+                <a:gridCol w="796603">
+                  <a:extLst>
+                    <a:ext uri="{9D8B030D-6E8A-4147-A177-3AD203B41FA5}">
+                      <a16:colId xmlns:a16="http://schemas.microsoft.com/office/drawing/2014/main" val="1984770133"/>
+                    </a:ext>
+                  </a:extLst>
+                </a:gridCol>
+                <a:gridCol w="796603">
+                  <a:extLst>
+                    <a:ext uri="{9D8B030D-6E8A-4147-A177-3AD203B41FA5}">
+                      <a16:colId xmlns:a16="http://schemas.microsoft.com/office/drawing/2014/main" val="2787051707"/>
+                    </a:ext>
+                  </a:extLst>
+                </a:gridCol>
+                <a:gridCol w="796603">
+                  <a:extLst>
+                    <a:ext uri="{9D8B030D-6E8A-4147-A177-3AD203B41FA5}">
+                      <a16:colId xmlns:a16="http://schemas.microsoft.com/office/drawing/2014/main" val="2702285658"/>
+                    </a:ext>
+                  </a:extLst>
+                </a:gridCol>
+              </a:tblGrid>
+              <a:tr h="568898">
+                <a:tc>
+                  <a:txBody>
+                    <a:bodyPr/>
+                    <a:lstStyle/>
+                    <a:p>
+                      <a:r>
+                        <a:rPr lang="en-US" sz="3200" dirty="0"/>
+                        <a:t>ID</a:t>
+                      </a:r>
+                    </a:p>
+                  </a:txBody>
+                  <a:tcPr marL="74204" marR="74204" marT="37102" marB="37102"/>
+                </a:tc>
+                <a:tc>
+                  <a:txBody>
+                    <a:bodyPr/>
+                    <a:lstStyle/>
+                    <a:p>
+                      <a:r>
+                        <a:rPr lang="en-US" sz="3200" dirty="0"/>
+                        <a:t>X_1</a:t>
+                      </a:r>
+                    </a:p>
+                  </a:txBody>
+                  <a:tcPr marL="74204" marR="74204" marT="37102" marB="37102"/>
+                </a:tc>
+                <a:tc>
+                  <a:txBody>
+                    <a:bodyPr/>
+                    <a:lstStyle/>
+                    <a:p>
+                      <a:r>
+                        <a:rPr lang="en-US" sz="3200" dirty="0"/>
+                        <a:t>X_2</a:t>
+                      </a:r>
+                    </a:p>
+                  </a:txBody>
+                  <a:tcPr marL="74204" marR="74204" marT="37102" marB="37102"/>
+                </a:tc>
+                <a:tc>
+                  <a:txBody>
+                    <a:bodyPr/>
+                    <a:lstStyle/>
+                    <a:p>
+                      <a:r>
+                        <a:rPr lang="en-US" sz="3200" dirty="0"/>
+                        <a:t>X_3</a:t>
+                      </a:r>
+                    </a:p>
+                  </a:txBody>
+                  <a:tcPr marL="74204" marR="74204" marT="37102" marB="37102"/>
+                </a:tc>
+                <a:tc>
+                  <a:txBody>
+                    <a:bodyPr/>
+                    <a:lstStyle/>
+                    <a:p>
+                      <a:r>
+                        <a:rPr lang="en-US" sz="3200" dirty="0"/>
+                        <a:t>X_4</a:t>
+                      </a:r>
+                    </a:p>
+                  </a:txBody>
+                  <a:tcPr marL="74204" marR="74204" marT="37102" marB="37102"/>
+                </a:tc>
+                <a:tc>
+                  <a:txBody>
+                    <a:bodyPr/>
+                    <a:lstStyle/>
+                    <a:p>
+                      <a:r>
+                        <a:rPr lang="en-US" sz="3200" dirty="0"/>
+                        <a:t>X_5</a:t>
+                      </a:r>
+                    </a:p>
+                  </a:txBody>
+                  <a:tcPr marL="74204" marR="74204" marT="37102" marB="37102"/>
+                </a:tc>
+                <a:extLst>
+                  <a:ext uri="{0D108BD9-81ED-4DB2-BD59-A6C34878D82A}">
+                    <a16:rowId xmlns:a16="http://schemas.microsoft.com/office/drawing/2014/main" val="682946059"/>
+                  </a:ext>
+                </a:extLst>
+              </a:tr>
+              <a:tr h="397899">
+                <a:tc>
+                  <a:txBody>
+                    <a:bodyPr/>
+                    <a:lstStyle/>
+                    <a:p>
+                      <a:r>
+                        <a:rPr lang="en-US" sz="1400" dirty="0"/>
+                        <a:t>1</a:t>
+                      </a:r>
+                    </a:p>
+                  </a:txBody>
+                  <a:tcPr marL="74204" marR="74204" marT="37102" marB="37102"/>
+                </a:tc>
+                <a:tc>
+                  <a:txBody>
+                    <a:bodyPr/>
+                    <a:lstStyle/>
+                    <a:p>
+                      <a:endParaRPr lang="en-US" sz="1400" dirty="0"/>
+                    </a:p>
+                  </a:txBody>
+                  <a:tcPr marL="74204" marR="74204" marT="37102" marB="37102"/>
+                </a:tc>
+                <a:tc>
+                  <a:txBody>
+                    <a:bodyPr/>
+                    <a:lstStyle/>
+                    <a:p>
+                      <a:endParaRPr lang="en-US" sz="1400" dirty="0"/>
+                    </a:p>
+                  </a:txBody>
+                  <a:tcPr marL="74204" marR="74204" marT="37102" marB="37102"/>
+                </a:tc>
+                <a:tc>
+                  <a:txBody>
+                    <a:bodyPr/>
+                    <a:lstStyle/>
+                    <a:p>
+                      <a:endParaRPr lang="en-US" sz="1400"/>
+                    </a:p>
+                  </a:txBody>
+                  <a:tcPr marL="74204" marR="74204" marT="37102" marB="37102"/>
+                </a:tc>
+                <a:tc>
+                  <a:txBody>
+                    <a:bodyPr/>
+                    <a:lstStyle/>
+                    <a:p>
+                      <a:endParaRPr lang="en-US" sz="1400" dirty="0"/>
+                    </a:p>
+                  </a:txBody>
+                  <a:tcPr marL="74204" marR="74204" marT="37102" marB="37102"/>
+                </a:tc>
+                <a:tc>
+                  <a:txBody>
+                    <a:bodyPr/>
+                    <a:lstStyle/>
+                    <a:p>
+                      <a:endParaRPr lang="en-US" sz="1400" dirty="0"/>
+                    </a:p>
+                  </a:txBody>
+                  <a:tcPr marL="74204" marR="74204" marT="37102" marB="37102"/>
+                </a:tc>
+                <a:extLst>
+                  <a:ext uri="{0D108BD9-81ED-4DB2-BD59-A6C34878D82A}">
+                    <a16:rowId xmlns:a16="http://schemas.microsoft.com/office/drawing/2014/main" val="1411340884"/>
+                  </a:ext>
+                </a:extLst>
+              </a:tr>
+              <a:tr h="397899">
+                <a:tc>
+                  <a:txBody>
+                    <a:bodyPr/>
+                    <a:lstStyle/>
+                    <a:p>
+                      <a:r>
+                        <a:rPr lang="en-US" sz="1400" dirty="0"/>
+                        <a:t>2</a:t>
+                      </a:r>
+                    </a:p>
+                  </a:txBody>
+                  <a:tcPr marL="74204" marR="74204" marT="37102" marB="37102"/>
+                </a:tc>
+                <a:tc>
+                  <a:txBody>
+                    <a:bodyPr/>
+                    <a:lstStyle/>
+                    <a:p>
+                      <a:endParaRPr lang="en-US" sz="1400" dirty="0"/>
+                    </a:p>
+                  </a:txBody>
+                  <a:tcPr marL="74204" marR="74204" marT="37102" marB="37102"/>
+                </a:tc>
+                <a:tc>
+                  <a:txBody>
+                    <a:bodyPr/>
+                    <a:lstStyle/>
+                    <a:p>
+                      <a:endParaRPr lang="en-US" sz="1400" dirty="0"/>
+                    </a:p>
+                  </a:txBody>
+                  <a:tcPr marL="74204" marR="74204" marT="37102" marB="37102"/>
+                </a:tc>
+                <a:tc>
+                  <a:txBody>
+                    <a:bodyPr/>
+                    <a:lstStyle/>
+                    <a:p>
+                      <a:endParaRPr lang="en-US" sz="1400" dirty="0"/>
+                    </a:p>
+                  </a:txBody>
+                  <a:tcPr marL="74204" marR="74204" marT="37102" marB="37102"/>
+                </a:tc>
+                <a:tc>
+                  <a:txBody>
+                    <a:bodyPr/>
+                    <a:lstStyle/>
+                    <a:p>
+                      <a:endParaRPr lang="en-US" sz="1400" dirty="0"/>
+                    </a:p>
+                  </a:txBody>
+                  <a:tcPr marL="74204" marR="74204" marT="37102" marB="37102"/>
+                </a:tc>
+                <a:tc>
+                  <a:txBody>
+                    <a:bodyPr/>
+                    <a:lstStyle/>
+                    <a:p>
+                      <a:endParaRPr lang="en-US" sz="1400" dirty="0"/>
+                    </a:p>
+                  </a:txBody>
+                  <a:tcPr marL="74204" marR="74204" marT="37102" marB="37102"/>
+                </a:tc>
+                <a:extLst>
+                  <a:ext uri="{0D108BD9-81ED-4DB2-BD59-A6C34878D82A}">
+                    <a16:rowId xmlns:a16="http://schemas.microsoft.com/office/drawing/2014/main" val="2850907027"/>
+                  </a:ext>
+                </a:extLst>
+              </a:tr>
+              <a:tr h="397899">
+                <a:tc>
+                  <a:txBody>
+                    <a:bodyPr/>
+                    <a:lstStyle/>
+                    <a:p>
+                      <a:r>
+                        <a:rPr lang="en-US" sz="1400" dirty="0"/>
+                        <a:t>3</a:t>
+                      </a:r>
+                    </a:p>
+                  </a:txBody>
+                  <a:tcPr marL="74204" marR="74204" marT="37102" marB="37102"/>
+                </a:tc>
+                <a:tc>
+                  <a:txBody>
+                    <a:bodyPr/>
+                    <a:lstStyle/>
+                    <a:p>
+                      <a:endParaRPr lang="en-US" sz="1400" dirty="0"/>
+                    </a:p>
+                  </a:txBody>
+                  <a:tcPr marL="74204" marR="74204" marT="37102" marB="37102"/>
+                </a:tc>
+                <a:tc>
+                  <a:txBody>
+                    <a:bodyPr/>
+                    <a:lstStyle/>
+                    <a:p>
+                      <a:endParaRPr lang="en-US" sz="1400" dirty="0"/>
+                    </a:p>
+                  </a:txBody>
+                  <a:tcPr marL="74204" marR="74204" marT="37102" marB="37102"/>
+                </a:tc>
+                <a:tc>
+                  <a:txBody>
+                    <a:bodyPr/>
+                    <a:lstStyle/>
+                    <a:p>
+                      <a:endParaRPr lang="en-US" sz="1400" dirty="0"/>
+                    </a:p>
+                  </a:txBody>
+                  <a:tcPr marL="74204" marR="74204" marT="37102" marB="37102"/>
+                </a:tc>
+                <a:tc>
+                  <a:txBody>
+                    <a:bodyPr/>
+                    <a:lstStyle/>
+                    <a:p>
+                      <a:endParaRPr lang="en-US" sz="1400" dirty="0"/>
+                    </a:p>
+                  </a:txBody>
+                  <a:tcPr marL="74204" marR="74204" marT="37102" marB="37102"/>
+                </a:tc>
+                <a:tc>
+                  <a:txBody>
+                    <a:bodyPr/>
+                    <a:lstStyle/>
+                    <a:p>
+                      <a:endParaRPr lang="en-US" sz="1400" dirty="0"/>
+                    </a:p>
+                  </a:txBody>
+                  <a:tcPr marL="74204" marR="74204" marT="37102" marB="37102"/>
+                </a:tc>
+                <a:extLst>
+                  <a:ext uri="{0D108BD9-81ED-4DB2-BD59-A6C34878D82A}">
+                    <a16:rowId xmlns:a16="http://schemas.microsoft.com/office/drawing/2014/main" val="974596321"/>
+                  </a:ext>
+                </a:extLst>
+              </a:tr>
+              <a:tr h="397899">
+                <a:tc>
+                  <a:txBody>
+                    <a:bodyPr/>
+                    <a:lstStyle/>
+                    <a:p>
+                      <a:r>
+                        <a:rPr lang="en-US" sz="1400" dirty="0"/>
+                        <a:t>4</a:t>
+                      </a:r>
+                    </a:p>
+                  </a:txBody>
+                  <a:tcPr marL="74204" marR="74204" marT="37102" marB="37102"/>
+                </a:tc>
+                <a:tc>
+                  <a:txBody>
+                    <a:bodyPr/>
+                    <a:lstStyle/>
+                    <a:p>
+                      <a:endParaRPr lang="en-US" sz="1400" dirty="0"/>
+                    </a:p>
+                  </a:txBody>
+                  <a:tcPr marL="74204" marR="74204" marT="37102" marB="37102"/>
+                </a:tc>
+                <a:tc>
+                  <a:txBody>
+                    <a:bodyPr/>
+                    <a:lstStyle/>
+                    <a:p>
+                      <a:endParaRPr lang="en-US" sz="1400" dirty="0"/>
+                    </a:p>
+                  </a:txBody>
+                  <a:tcPr marL="74204" marR="74204" marT="37102" marB="37102"/>
+                </a:tc>
+                <a:tc>
+                  <a:txBody>
+                    <a:bodyPr/>
+                    <a:lstStyle/>
+                    <a:p>
+                      <a:endParaRPr lang="en-US" sz="1400" dirty="0"/>
+                    </a:p>
+                  </a:txBody>
+                  <a:tcPr marL="74204" marR="74204" marT="37102" marB="37102"/>
+                </a:tc>
+                <a:tc>
+                  <a:txBody>
+                    <a:bodyPr/>
+                    <a:lstStyle/>
+                    <a:p>
+                      <a:endParaRPr lang="en-US" sz="1400" dirty="0"/>
+                    </a:p>
+                  </a:txBody>
+                  <a:tcPr marL="74204" marR="74204" marT="37102" marB="37102"/>
+                </a:tc>
+                <a:tc>
+                  <a:txBody>
+                    <a:bodyPr/>
+                    <a:lstStyle/>
+                    <a:p>
+                      <a:endParaRPr lang="en-US" sz="1400" dirty="0"/>
+                    </a:p>
+                  </a:txBody>
+                  <a:tcPr marL="74204" marR="74204" marT="37102" marB="37102"/>
+                </a:tc>
+                <a:extLst>
+                  <a:ext uri="{0D108BD9-81ED-4DB2-BD59-A6C34878D82A}">
+                    <a16:rowId xmlns:a16="http://schemas.microsoft.com/office/drawing/2014/main" val="2798937669"/>
+                  </a:ext>
+                </a:extLst>
+              </a:tr>
+            </a:tbl>
+          </a:graphicData>
+        </a:graphic>
+      </p:graphicFrame>
+      <mc:AlternateContent xmlns:mc="http://schemas.openxmlformats.org/markup-compatibility/2006">
+        <mc:Choice xmlns:a14="http://schemas.microsoft.com/office/drawing/2010/main" Requires="a14">
+          <p:graphicFrame>
+            <p:nvGraphicFramePr>
+              <p:cNvPr id="10" name="Table 9">
+                <a:extLst>
+                  <a:ext uri="{FF2B5EF4-FFF2-40B4-BE49-F238E27FC236}">
+                    <a16:creationId xmlns:a16="http://schemas.microsoft.com/office/drawing/2014/main" id="{F3271B12-B4DE-1E3F-EF20-EE940B17E660}"/>
+                  </a:ext>
+                </a:extLst>
+              </p:cNvPr>
+              <p:cNvGraphicFramePr>
+                <a:graphicFrameLocks noGrp="1"/>
+              </p:cNvGraphicFramePr>
+              <p:nvPr>
+                <p:extLst>
+                  <p:ext uri="{D42A27DB-BD31-4B8C-83A1-F6EECF244321}">
+                    <p14:modId xmlns:p14="http://schemas.microsoft.com/office/powerpoint/2010/main" val="2847452867"/>
+                  </p:ext>
+                </p:extLst>
+              </p:nvPr>
+            </p:nvGraphicFramePr>
+            <p:xfrm>
+              <a:off x="10232043" y="2155634"/>
+              <a:ext cx="706784" cy="2160493"/>
+            </p:xfrm>
+            <a:graphic>
+              <a:graphicData uri="http://schemas.openxmlformats.org/drawingml/2006/table">
+                <a:tbl>
+                  <a:tblPr firstRow="1" bandRow="1">
+                    <a:tableStyleId>{5C22544A-7EE6-4342-B048-85BDC9FD1C3A}</a:tableStyleId>
+                  </a:tblPr>
+                  <a:tblGrid>
+                    <a:gridCol w="706784">
+                      <a:extLst>
+                        <a:ext uri="{9D8B030D-6E8A-4147-A177-3AD203B41FA5}">
+                          <a16:colId xmlns:a16="http://schemas.microsoft.com/office/drawing/2014/main" val="1361816447"/>
+                        </a:ext>
+                      </a:extLst>
+                    </a:gridCol>
+                  </a:tblGrid>
+                  <a:tr h="578669">
+                    <a:tc>
+                      <a:txBody>
+                        <a:bodyPr/>
+                        <a:lstStyle/>
+                        <a:p>
+                          <a14:m>
+                            <m:oMathPara xmlns:m="http://schemas.openxmlformats.org/officeDocument/2006/math">
+                              <m:oMathParaPr>
+                                <m:jc m:val="centerGroup"/>
+                              </m:oMathParaPr>
+                              <m:oMath xmlns:m="http://schemas.openxmlformats.org/officeDocument/2006/math">
+                                <m:acc>
+                                  <m:accPr>
+                                    <m:chr m:val="̂"/>
+                                    <m:ctrlPr>
+                                      <a:rPr lang="en-US" sz="3000" b="0" i="1" dirty="0" smtClean="0">
+                                        <a:latin typeface="Cambria Math" panose="02040503050406030204" pitchFamily="18" charset="0"/>
+                                      </a:rPr>
+                                    </m:ctrlPr>
+                                  </m:accPr>
+                                  <m:e>
+                                    <m:r>
+                                      <a:rPr lang="en-US" sz="3000" b="0" i="1" dirty="0" smtClean="0">
+                                        <a:latin typeface="Cambria Math" panose="02040503050406030204" pitchFamily="18" charset="0"/>
+                                      </a:rPr>
+                                      <m:t>𝑌</m:t>
+                                    </m:r>
+                                  </m:e>
+                                </m:acc>
+                              </m:oMath>
+                            </m:oMathPara>
+                          </a14:m>
+                          <a:endParaRPr lang="en-US" sz="1300" b="0" dirty="0"/>
+                        </a:p>
+                      </a:txBody>
+                      <a:tcPr marL="69535" marR="69535" marT="34767" marB="34767"/>
+                    </a:tc>
+                    <a:extLst>
+                      <a:ext uri="{0D108BD9-81ED-4DB2-BD59-A6C34878D82A}">
+                        <a16:rowId xmlns:a16="http://schemas.microsoft.com/office/drawing/2014/main" val="277695215"/>
+                      </a:ext>
+                    </a:extLst>
+                  </a:tr>
+                  <a:tr h="395456">
+                    <a:tc>
+                      <a:txBody>
+                        <a:bodyPr/>
+                        <a:lstStyle/>
+                        <a:p>
+                          <a:endParaRPr lang="en-US" sz="1300" dirty="0"/>
+                        </a:p>
+                      </a:txBody>
+                      <a:tcPr marL="69535" marR="69535" marT="34767" marB="34767"/>
+                    </a:tc>
+                    <a:extLst>
+                      <a:ext uri="{0D108BD9-81ED-4DB2-BD59-A6C34878D82A}">
+                        <a16:rowId xmlns:a16="http://schemas.microsoft.com/office/drawing/2014/main" val="2162110496"/>
+                      </a:ext>
+                    </a:extLst>
+                  </a:tr>
+                  <a:tr h="395456">
+                    <a:tc>
+                      <a:txBody>
+                        <a:bodyPr/>
+                        <a:lstStyle/>
+                        <a:p>
+                          <a:endParaRPr lang="en-US" sz="1300" dirty="0"/>
+                        </a:p>
+                      </a:txBody>
+                      <a:tcPr marL="69535" marR="69535" marT="34767" marB="34767"/>
+                    </a:tc>
+                    <a:extLst>
+                      <a:ext uri="{0D108BD9-81ED-4DB2-BD59-A6C34878D82A}">
+                        <a16:rowId xmlns:a16="http://schemas.microsoft.com/office/drawing/2014/main" val="3564268987"/>
+                      </a:ext>
+                    </a:extLst>
+                  </a:tr>
+                  <a:tr h="395456">
+                    <a:tc>
+                      <a:txBody>
+                        <a:bodyPr/>
+                        <a:lstStyle/>
+                        <a:p>
+                          <a:endParaRPr lang="en-US" sz="1300" dirty="0"/>
+                        </a:p>
+                      </a:txBody>
+                      <a:tcPr marL="69535" marR="69535" marT="34767" marB="34767"/>
+                    </a:tc>
+                    <a:extLst>
+                      <a:ext uri="{0D108BD9-81ED-4DB2-BD59-A6C34878D82A}">
+                        <a16:rowId xmlns:a16="http://schemas.microsoft.com/office/drawing/2014/main" val="1046935129"/>
+                      </a:ext>
+                    </a:extLst>
+                  </a:tr>
+                  <a:tr h="395456">
+                    <a:tc>
+                      <a:txBody>
+                        <a:bodyPr/>
+                        <a:lstStyle/>
+                        <a:p>
+                          <a:endParaRPr lang="en-US" sz="1300" dirty="0"/>
+                        </a:p>
+                      </a:txBody>
+                      <a:tcPr marL="69535" marR="69535" marT="34767" marB="34767"/>
+                    </a:tc>
+                    <a:extLst>
+                      <a:ext uri="{0D108BD9-81ED-4DB2-BD59-A6C34878D82A}">
+                        <a16:rowId xmlns:a16="http://schemas.microsoft.com/office/drawing/2014/main" val="3936094547"/>
+                      </a:ext>
+                    </a:extLst>
+                  </a:tr>
+                </a:tbl>
+              </a:graphicData>
+            </a:graphic>
+          </p:graphicFrame>
+        </mc:Choice>
+        <mc:Fallback>
+          <p:graphicFrame>
+            <p:nvGraphicFramePr>
+              <p:cNvPr id="10" name="Table 9">
+                <a:extLst>
+                  <a:ext uri="{FF2B5EF4-FFF2-40B4-BE49-F238E27FC236}">
+                    <a16:creationId xmlns:a16="http://schemas.microsoft.com/office/drawing/2014/main" id="{F3271B12-B4DE-1E3F-EF20-EE940B17E660}"/>
+                  </a:ext>
+                </a:extLst>
+              </p:cNvPr>
+              <p:cNvGraphicFramePr>
+                <a:graphicFrameLocks noGrp="1"/>
+              </p:cNvGraphicFramePr>
+              <p:nvPr>
+                <p:extLst>
+                  <p:ext uri="{D42A27DB-BD31-4B8C-83A1-F6EECF244321}">
+                    <p14:modId xmlns:p14="http://schemas.microsoft.com/office/powerpoint/2010/main" val="2847452867"/>
+                  </p:ext>
+                </p:extLst>
+              </p:nvPr>
+            </p:nvGraphicFramePr>
+            <p:xfrm>
+              <a:off x="10232043" y="2155634"/>
+              <a:ext cx="706784" cy="2160493"/>
+            </p:xfrm>
+            <a:graphic>
+              <a:graphicData uri="http://schemas.openxmlformats.org/drawingml/2006/table">
+                <a:tbl>
+                  <a:tblPr firstRow="1" bandRow="1">
+                    <a:tableStyleId>{5C22544A-7EE6-4342-B048-85BDC9FD1C3A}</a:tableStyleId>
+                  </a:tblPr>
+                  <a:tblGrid>
+                    <a:gridCol w="706784">
+                      <a:extLst>
+                        <a:ext uri="{9D8B030D-6E8A-4147-A177-3AD203B41FA5}">
+                          <a16:colId xmlns:a16="http://schemas.microsoft.com/office/drawing/2014/main" val="1361816447"/>
+                        </a:ext>
+                      </a:extLst>
+                    </a:gridCol>
+                  </a:tblGrid>
+                  <a:tr h="578669">
+                    <a:tc>
+                      <a:txBody>
+                        <a:bodyPr/>
+                        <a:lstStyle/>
+                        <a:p>
+                          <a:endParaRPr lang="en-US"/>
+                        </a:p>
+                      </a:txBody>
+                      <a:tcPr marL="69535" marR="69535" marT="34767" marB="34767">
+                        <a:blipFill>
+                          <a:blip r:embed="rId2"/>
+                          <a:stretch>
+                            <a:fillRect l="-1754" t="-13043" r="-3509" b="-276087"/>
+                          </a:stretch>
+                        </a:blipFill>
+                      </a:tcPr>
+                    </a:tc>
+                    <a:extLst>
+                      <a:ext uri="{0D108BD9-81ED-4DB2-BD59-A6C34878D82A}">
+                        <a16:rowId xmlns:a16="http://schemas.microsoft.com/office/drawing/2014/main" val="277695215"/>
+                      </a:ext>
+                    </a:extLst>
+                  </a:tr>
+                  <a:tr h="395456">
+                    <a:tc>
+                      <a:txBody>
+                        <a:bodyPr/>
+                        <a:lstStyle/>
+                        <a:p>
+                          <a:endParaRPr lang="en-US" sz="1300" dirty="0"/>
+                        </a:p>
+                      </a:txBody>
+                      <a:tcPr marL="69535" marR="69535" marT="34767" marB="34767"/>
+                    </a:tc>
+                    <a:extLst>
+                      <a:ext uri="{0D108BD9-81ED-4DB2-BD59-A6C34878D82A}">
+                        <a16:rowId xmlns:a16="http://schemas.microsoft.com/office/drawing/2014/main" val="2162110496"/>
+                      </a:ext>
+                    </a:extLst>
+                  </a:tr>
+                  <a:tr h="395456">
+                    <a:tc>
+                      <a:txBody>
+                        <a:bodyPr/>
+                        <a:lstStyle/>
+                        <a:p>
+                          <a:endParaRPr lang="en-US" sz="1300" dirty="0"/>
+                        </a:p>
+                      </a:txBody>
+                      <a:tcPr marL="69535" marR="69535" marT="34767" marB="34767"/>
+                    </a:tc>
+                    <a:extLst>
+                      <a:ext uri="{0D108BD9-81ED-4DB2-BD59-A6C34878D82A}">
+                        <a16:rowId xmlns:a16="http://schemas.microsoft.com/office/drawing/2014/main" val="3564268987"/>
+                      </a:ext>
+                    </a:extLst>
+                  </a:tr>
+                  <a:tr h="395456">
+                    <a:tc>
+                      <a:txBody>
+                        <a:bodyPr/>
+                        <a:lstStyle/>
+                        <a:p>
+                          <a:endParaRPr lang="en-US" sz="1300" dirty="0"/>
+                        </a:p>
+                      </a:txBody>
+                      <a:tcPr marL="69535" marR="69535" marT="34767" marB="34767"/>
+                    </a:tc>
+                    <a:extLst>
+                      <a:ext uri="{0D108BD9-81ED-4DB2-BD59-A6C34878D82A}">
+                        <a16:rowId xmlns:a16="http://schemas.microsoft.com/office/drawing/2014/main" val="1046935129"/>
+                      </a:ext>
+                    </a:extLst>
+                  </a:tr>
+                  <a:tr h="395456">
+                    <a:tc>
+                      <a:txBody>
+                        <a:bodyPr/>
+                        <a:lstStyle/>
+                        <a:p>
+                          <a:endParaRPr lang="en-US" sz="1300" dirty="0"/>
+                        </a:p>
+                      </a:txBody>
+                      <a:tcPr marL="69535" marR="69535" marT="34767" marB="34767"/>
+                    </a:tc>
+                    <a:extLst>
+                      <a:ext uri="{0D108BD9-81ED-4DB2-BD59-A6C34878D82A}">
+                        <a16:rowId xmlns:a16="http://schemas.microsoft.com/office/drawing/2014/main" val="3936094547"/>
+                      </a:ext>
+                    </a:extLst>
+                  </a:tr>
+                </a:tbl>
+              </a:graphicData>
+            </a:graphic>
+          </p:graphicFrame>
+        </mc:Fallback>
+      </mc:AlternateContent>
+      <p:cxnSp>
+        <p:nvCxnSpPr>
+          <p:cNvPr id="22" name="Straight Arrow Connector 21">
+            <a:extLst>
+              <a:ext uri="{FF2B5EF4-FFF2-40B4-BE49-F238E27FC236}">
+                <a16:creationId xmlns:a16="http://schemas.microsoft.com/office/drawing/2014/main" id="{FEA22E17-5D11-72FA-3378-E37F49BBC2CD}"/>
+              </a:ext>
+            </a:extLst>
+          </p:cNvPr>
+          <p:cNvCxnSpPr>
+            <a:cxnSpLocks/>
+          </p:cNvCxnSpPr>
+          <p:nvPr/>
+        </p:nvCxnSpPr>
+        <p:spPr>
+          <a:xfrm>
+            <a:off x="5505757" y="3429000"/>
+            <a:ext cx="972976" cy="0"/>
+          </a:xfrm>
+          <a:prstGeom prst="straightConnector1">
+            <a:avLst/>
+          </a:prstGeom>
+          <a:ln w="190500">
+            <a:tailEnd type="triangle"/>
+          </a:ln>
+        </p:spPr>
+        <p:style>
+          <a:lnRef idx="1">
+            <a:schemeClr val="accent1"/>
+          </a:lnRef>
+          <a:fillRef idx="0">
+            <a:schemeClr val="accent1"/>
+          </a:fillRef>
+          <a:effectRef idx="0">
+            <a:schemeClr val="accent1"/>
+          </a:effectRef>
+          <a:fontRef idx="minor">
+            <a:schemeClr val="tx1"/>
+          </a:fontRef>
+        </p:style>
+      </p:cxnSp>
+      <p:cxnSp>
+        <p:nvCxnSpPr>
+          <p:cNvPr id="24" name="Straight Arrow Connector 23">
+            <a:extLst>
+              <a:ext uri="{FF2B5EF4-FFF2-40B4-BE49-F238E27FC236}">
+                <a16:creationId xmlns:a16="http://schemas.microsoft.com/office/drawing/2014/main" id="{FAB7B77B-EE0B-E356-7774-AE464A292DE9}"/>
+              </a:ext>
+            </a:extLst>
+          </p:cNvPr>
+          <p:cNvCxnSpPr>
+            <a:cxnSpLocks/>
+          </p:cNvCxnSpPr>
+          <p:nvPr/>
+        </p:nvCxnSpPr>
+        <p:spPr>
+          <a:xfrm>
+            <a:off x="9200184" y="3429000"/>
+            <a:ext cx="972976" cy="0"/>
+          </a:xfrm>
+          <a:prstGeom prst="straightConnector1">
+            <a:avLst/>
+          </a:prstGeom>
+          <a:ln w="190500">
+            <a:tailEnd type="triangle"/>
+          </a:ln>
+        </p:spPr>
+        <p:style>
+          <a:lnRef idx="1">
+            <a:schemeClr val="accent1"/>
+          </a:lnRef>
+          <a:fillRef idx="0">
+            <a:schemeClr val="accent1"/>
+          </a:fillRef>
+          <a:effectRef idx="0">
+            <a:schemeClr val="accent1"/>
+          </a:effectRef>
+          <a:fontRef idx="minor">
+            <a:schemeClr val="tx1"/>
+          </a:fontRef>
+        </p:style>
+      </p:cxnSp>
+      <p:pic>
+        <p:nvPicPr>
+          <p:cNvPr id="25" name="Graphic 24" descr="Box outline">
+            <a:extLst>
+              <a:ext uri="{FF2B5EF4-FFF2-40B4-BE49-F238E27FC236}">
+                <a16:creationId xmlns:a16="http://schemas.microsoft.com/office/drawing/2014/main" id="{0979CDA8-CF91-13D7-E1E9-C3034C8D6A44}"/>
+              </a:ext>
+            </a:extLst>
+          </p:cNvPr>
+          <p:cNvPicPr>
+            <a:picLocks noChangeAspect="1"/>
+          </p:cNvPicPr>
+          <p:nvPr/>
+        </p:nvPicPr>
+        <p:blipFill>
+          <a:blip r:embed="rId3">
+            <a:extLst>
+              <a:ext uri="{96DAC541-7B7A-43D3-8B79-37D633B846F1}">
+                <asvg:svgBlip xmlns:asvg="http://schemas.microsoft.com/office/drawing/2016/SVG/main" r:embed="rId4"/>
+              </a:ext>
+            </a:extLst>
+          </a:blip>
+          <a:stretch>
+            <a:fillRect/>
+          </a:stretch>
+        </p:blipFill>
+        <p:spPr>
+          <a:xfrm>
+            <a:off x="6261445" y="1669456"/>
+            <a:ext cx="3172646" cy="3172646"/>
+          </a:xfrm>
+          <a:prstGeom prst="rect">
+            <a:avLst/>
+          </a:prstGeom>
+        </p:spPr>
+      </p:pic>
+      <p:pic>
+        <p:nvPicPr>
+          <p:cNvPr id="27" name="Graphic 26" descr="Question Mark with solid fill">
+            <a:extLst>
+              <a:ext uri="{FF2B5EF4-FFF2-40B4-BE49-F238E27FC236}">
+                <a16:creationId xmlns:a16="http://schemas.microsoft.com/office/drawing/2014/main" id="{75252932-6301-9F98-7F00-65A021E608D0}"/>
+              </a:ext>
+            </a:extLst>
+          </p:cNvPr>
+          <p:cNvPicPr>
+            <a:picLocks noChangeAspect="1"/>
+          </p:cNvPicPr>
+          <p:nvPr/>
+        </p:nvPicPr>
+        <p:blipFill>
+          <a:blip r:embed="rId5">
+            <a:extLst>
+              <a:ext uri="{96DAC541-7B7A-43D3-8B79-37D633B846F1}">
+                <asvg:svgBlip xmlns:asvg="http://schemas.microsoft.com/office/drawing/2016/SVG/main" r:embed="rId6"/>
+              </a:ext>
+            </a:extLst>
+          </a:blip>
+          <a:stretch>
+            <a:fillRect/>
+          </a:stretch>
+        </p:blipFill>
+        <p:spPr>
+          <a:xfrm>
+            <a:off x="6777221" y="3079376"/>
+            <a:ext cx="914400" cy="914400"/>
+          </a:xfrm>
+          <a:prstGeom prst="rect">
+            <a:avLst/>
+          </a:prstGeom>
+        </p:spPr>
+      </p:pic>
+    </p:spTree>
+    <p:extLst>
+      <p:ext uri="{BB962C8B-B14F-4D97-AF65-F5344CB8AC3E}">
+        <p14:creationId xmlns:p14="http://schemas.microsoft.com/office/powerpoint/2010/main" val="1067695829"/>
+      </p:ext>
+    </p:extLst>
+  </p:cSld>
+  <p:clrMapOvr>
+    <a:masterClrMapping/>
+  </p:clrMapOvr>
+</p:sld>
+</file>
+
+<file path=ppt/slides/slide9.xml><?xml version="1.0" encoding="utf-8"?>
+<p:sld xmlns:a="http://schemas.openxmlformats.org/drawingml/2006/main" xmlns:r="http://schemas.openxmlformats.org/officeDocument/2006/relationships" xmlns:p="http://schemas.openxmlformats.org/presentationml/2006/main">
+  <p:cSld>
+    <p:spTree>
+      <p:nvGrpSpPr>
+        <p:cNvPr id="1" name=""/>
+        <p:cNvGrpSpPr/>
+        <p:nvPr/>
+      </p:nvGrpSpPr>
+      <p:grpSpPr>
+        <a:xfrm>
+          <a:off x="0" y="0"/>
+          <a:ext cx="0" cy="0"/>
+          <a:chOff x="0" y="0"/>
+          <a:chExt cx="0" cy="0"/>
+        </a:xfrm>
+      </p:grpSpPr>
+      <p:graphicFrame>
+        <p:nvGraphicFramePr>
+          <p:cNvPr id="8" name="Table 4">
+            <a:extLst>
+              <a:ext uri="{FF2B5EF4-FFF2-40B4-BE49-F238E27FC236}">
+                <a16:creationId xmlns:a16="http://schemas.microsoft.com/office/drawing/2014/main" id="{9B920787-7288-7827-CDE7-633C71CC219D}"/>
+              </a:ext>
+            </a:extLst>
+          </p:cNvPr>
+          <p:cNvGraphicFramePr>
+            <a:graphicFrameLocks noGrp="1"/>
+          </p:cNvGraphicFramePr>
+          <p:nvPr/>
+        </p:nvGraphicFramePr>
+        <p:xfrm>
+          <a:off x="726139" y="2146858"/>
+          <a:ext cx="4779618" cy="2160494"/>
+        </p:xfrm>
+        <a:graphic>
+          <a:graphicData uri="http://schemas.openxmlformats.org/drawingml/2006/table">
+            <a:tbl>
+              <a:tblPr firstRow="1" bandRow="1">
+                <a:tableStyleId>{5C22544A-7EE6-4342-B048-85BDC9FD1C3A}</a:tableStyleId>
+              </a:tblPr>
+              <a:tblGrid>
+                <a:gridCol w="796603">
+                  <a:extLst>
+                    <a:ext uri="{9D8B030D-6E8A-4147-A177-3AD203B41FA5}">
+                      <a16:colId xmlns:a16="http://schemas.microsoft.com/office/drawing/2014/main" val="2997985592"/>
+                    </a:ext>
+                  </a:extLst>
+                </a:gridCol>
+                <a:gridCol w="796603">
+                  <a:extLst>
+                    <a:ext uri="{9D8B030D-6E8A-4147-A177-3AD203B41FA5}">
+                      <a16:colId xmlns:a16="http://schemas.microsoft.com/office/drawing/2014/main" val="4138932228"/>
+                    </a:ext>
+                  </a:extLst>
+                </a:gridCol>
+                <a:gridCol w="796603">
+                  <a:extLst>
+                    <a:ext uri="{9D8B030D-6E8A-4147-A177-3AD203B41FA5}">
+                      <a16:colId xmlns:a16="http://schemas.microsoft.com/office/drawing/2014/main" val="370515256"/>
+                    </a:ext>
+                  </a:extLst>
+                </a:gridCol>
+                <a:gridCol w="796603">
+                  <a:extLst>
+                    <a:ext uri="{9D8B030D-6E8A-4147-A177-3AD203B41FA5}">
+                      <a16:colId xmlns:a16="http://schemas.microsoft.com/office/drawing/2014/main" val="1984770133"/>
+                    </a:ext>
+                  </a:extLst>
+                </a:gridCol>
+                <a:gridCol w="796603">
+                  <a:extLst>
+                    <a:ext uri="{9D8B030D-6E8A-4147-A177-3AD203B41FA5}">
+                      <a16:colId xmlns:a16="http://schemas.microsoft.com/office/drawing/2014/main" val="2787051707"/>
+                    </a:ext>
+                  </a:extLst>
+                </a:gridCol>
+                <a:gridCol w="796603">
+                  <a:extLst>
+                    <a:ext uri="{9D8B030D-6E8A-4147-A177-3AD203B41FA5}">
+                      <a16:colId xmlns:a16="http://schemas.microsoft.com/office/drawing/2014/main" val="2702285658"/>
+                    </a:ext>
+                  </a:extLst>
+                </a:gridCol>
+              </a:tblGrid>
+              <a:tr h="568898">
+                <a:tc>
+                  <a:txBody>
+                    <a:bodyPr/>
+                    <a:lstStyle/>
+                    <a:p>
+                      <a:r>
+                        <a:rPr lang="en-US" sz="3200" dirty="0"/>
+                        <a:t>ID</a:t>
+                      </a:r>
+                    </a:p>
+                  </a:txBody>
+                  <a:tcPr marL="74204" marR="74204" marT="37102" marB="37102"/>
+                </a:tc>
+                <a:tc>
+                  <a:txBody>
+                    <a:bodyPr/>
+                    <a:lstStyle/>
+                    <a:p>
+                      <a:r>
+                        <a:rPr lang="en-US" sz="3200" dirty="0"/>
+                        <a:t>X_1</a:t>
+                      </a:r>
+                    </a:p>
+                  </a:txBody>
+                  <a:tcPr marL="74204" marR="74204" marT="37102" marB="37102"/>
+                </a:tc>
+                <a:tc>
+                  <a:txBody>
+                    <a:bodyPr/>
+                    <a:lstStyle/>
+                    <a:p>
+                      <a:r>
+                        <a:rPr lang="en-US" sz="3200" dirty="0"/>
+                        <a:t>X_2</a:t>
+                      </a:r>
+                    </a:p>
+                  </a:txBody>
+                  <a:tcPr marL="74204" marR="74204" marT="37102" marB="37102"/>
+                </a:tc>
+                <a:tc>
+                  <a:txBody>
+                    <a:bodyPr/>
+                    <a:lstStyle/>
+                    <a:p>
+                      <a:r>
+                        <a:rPr lang="en-US" sz="3200" dirty="0"/>
+                        <a:t>X_3</a:t>
+                      </a:r>
+                    </a:p>
+                  </a:txBody>
+                  <a:tcPr marL="74204" marR="74204" marT="37102" marB="37102"/>
+                </a:tc>
+                <a:tc>
+                  <a:txBody>
+                    <a:bodyPr/>
+                    <a:lstStyle/>
+                    <a:p>
+                      <a:r>
+                        <a:rPr lang="en-US" sz="3200" dirty="0"/>
+                        <a:t>X_4</a:t>
+                      </a:r>
+                    </a:p>
+                  </a:txBody>
+                  <a:tcPr marL="74204" marR="74204" marT="37102" marB="37102"/>
+                </a:tc>
+                <a:tc>
+                  <a:txBody>
+                    <a:bodyPr/>
+                    <a:lstStyle/>
+                    <a:p>
+                      <a:r>
+                        <a:rPr lang="en-US" sz="3200" dirty="0"/>
+                        <a:t>X_5</a:t>
+                      </a:r>
+                    </a:p>
+                  </a:txBody>
+                  <a:tcPr marL="74204" marR="74204" marT="37102" marB="37102"/>
+                </a:tc>
+                <a:extLst>
+                  <a:ext uri="{0D108BD9-81ED-4DB2-BD59-A6C34878D82A}">
+                    <a16:rowId xmlns:a16="http://schemas.microsoft.com/office/drawing/2014/main" val="682946059"/>
+                  </a:ext>
+                </a:extLst>
+              </a:tr>
+              <a:tr h="397899">
+                <a:tc>
+                  <a:txBody>
+                    <a:bodyPr/>
+                    <a:lstStyle/>
+                    <a:p>
+                      <a:r>
+                        <a:rPr lang="en-US" sz="1400" dirty="0"/>
+                        <a:t>1</a:t>
+                      </a:r>
+                    </a:p>
+                  </a:txBody>
+                  <a:tcPr marL="74204" marR="74204" marT="37102" marB="37102"/>
+                </a:tc>
+                <a:tc>
+                  <a:txBody>
+                    <a:bodyPr/>
+                    <a:lstStyle/>
+                    <a:p>
+                      <a:endParaRPr lang="en-US" sz="1400" dirty="0"/>
+                    </a:p>
+                  </a:txBody>
+                  <a:tcPr marL="74204" marR="74204" marT="37102" marB="37102"/>
+                </a:tc>
+                <a:tc>
+                  <a:txBody>
+                    <a:bodyPr/>
+                    <a:lstStyle/>
+                    <a:p>
+                      <a:endParaRPr lang="en-US" sz="1400" dirty="0"/>
+                    </a:p>
+                  </a:txBody>
+                  <a:tcPr marL="74204" marR="74204" marT="37102" marB="37102"/>
+                </a:tc>
+                <a:tc>
+                  <a:txBody>
+                    <a:bodyPr/>
+                    <a:lstStyle/>
+                    <a:p>
+                      <a:endParaRPr lang="en-US" sz="1400"/>
+                    </a:p>
+                  </a:txBody>
+                  <a:tcPr marL="74204" marR="74204" marT="37102" marB="37102"/>
+                </a:tc>
+                <a:tc>
+                  <a:txBody>
+                    <a:bodyPr/>
+                    <a:lstStyle/>
+                    <a:p>
+                      <a:endParaRPr lang="en-US" sz="1400" dirty="0"/>
+                    </a:p>
+                  </a:txBody>
+                  <a:tcPr marL="74204" marR="74204" marT="37102" marB="37102"/>
+                </a:tc>
+                <a:tc>
+                  <a:txBody>
+                    <a:bodyPr/>
+                    <a:lstStyle/>
+                    <a:p>
+                      <a:endParaRPr lang="en-US" sz="1400" dirty="0"/>
+                    </a:p>
+                  </a:txBody>
+                  <a:tcPr marL="74204" marR="74204" marT="37102" marB="37102"/>
+                </a:tc>
+                <a:extLst>
+                  <a:ext uri="{0D108BD9-81ED-4DB2-BD59-A6C34878D82A}">
+                    <a16:rowId xmlns:a16="http://schemas.microsoft.com/office/drawing/2014/main" val="1411340884"/>
+                  </a:ext>
+                </a:extLst>
+              </a:tr>
+              <a:tr h="397899">
+                <a:tc>
+                  <a:txBody>
+                    <a:bodyPr/>
+                    <a:lstStyle/>
+                    <a:p>
+                      <a:r>
+                        <a:rPr lang="en-US" sz="1400" dirty="0"/>
+                        <a:t>2</a:t>
+                      </a:r>
+                    </a:p>
+                  </a:txBody>
+                  <a:tcPr marL="74204" marR="74204" marT="37102" marB="37102"/>
+                </a:tc>
+                <a:tc>
+                  <a:txBody>
+                    <a:bodyPr/>
+                    <a:lstStyle/>
+                    <a:p>
+                      <a:endParaRPr lang="en-US" sz="1400" dirty="0"/>
+                    </a:p>
+                  </a:txBody>
+                  <a:tcPr marL="74204" marR="74204" marT="37102" marB="37102"/>
+                </a:tc>
+                <a:tc>
+                  <a:txBody>
+                    <a:bodyPr/>
+                    <a:lstStyle/>
+                    <a:p>
+                      <a:endParaRPr lang="en-US" sz="1400" dirty="0"/>
+                    </a:p>
+                  </a:txBody>
+                  <a:tcPr marL="74204" marR="74204" marT="37102" marB="37102"/>
+                </a:tc>
+                <a:tc>
+                  <a:txBody>
+                    <a:bodyPr/>
+                    <a:lstStyle/>
+                    <a:p>
+                      <a:endParaRPr lang="en-US" sz="1400" dirty="0"/>
+                    </a:p>
+                  </a:txBody>
+                  <a:tcPr marL="74204" marR="74204" marT="37102" marB="37102"/>
+                </a:tc>
+                <a:tc>
+                  <a:txBody>
+                    <a:bodyPr/>
+                    <a:lstStyle/>
+                    <a:p>
+                      <a:endParaRPr lang="en-US" sz="1400" dirty="0"/>
+                    </a:p>
+                  </a:txBody>
+                  <a:tcPr marL="74204" marR="74204" marT="37102" marB="37102"/>
+                </a:tc>
+                <a:tc>
+                  <a:txBody>
+                    <a:bodyPr/>
+                    <a:lstStyle/>
+                    <a:p>
+                      <a:endParaRPr lang="en-US" sz="1400" dirty="0"/>
+                    </a:p>
+                  </a:txBody>
+                  <a:tcPr marL="74204" marR="74204" marT="37102" marB="37102"/>
+                </a:tc>
+                <a:extLst>
+                  <a:ext uri="{0D108BD9-81ED-4DB2-BD59-A6C34878D82A}">
+                    <a16:rowId xmlns:a16="http://schemas.microsoft.com/office/drawing/2014/main" val="2850907027"/>
+                  </a:ext>
+                </a:extLst>
+              </a:tr>
+              <a:tr h="397899">
+                <a:tc>
+                  <a:txBody>
+                    <a:bodyPr/>
+                    <a:lstStyle/>
+                    <a:p>
+                      <a:r>
+                        <a:rPr lang="en-US" sz="1400" dirty="0"/>
+                        <a:t>3</a:t>
+                      </a:r>
+                    </a:p>
+                  </a:txBody>
+                  <a:tcPr marL="74204" marR="74204" marT="37102" marB="37102"/>
+                </a:tc>
+                <a:tc>
+                  <a:txBody>
+                    <a:bodyPr/>
+                    <a:lstStyle/>
+                    <a:p>
+                      <a:endParaRPr lang="en-US" sz="1400" dirty="0"/>
+                    </a:p>
+                  </a:txBody>
+                  <a:tcPr marL="74204" marR="74204" marT="37102" marB="37102"/>
+                </a:tc>
+                <a:tc>
+                  <a:txBody>
+                    <a:bodyPr/>
+                    <a:lstStyle/>
+                    <a:p>
+                      <a:endParaRPr lang="en-US" sz="1400" dirty="0"/>
+                    </a:p>
+                  </a:txBody>
+                  <a:tcPr marL="74204" marR="74204" marT="37102" marB="37102"/>
+                </a:tc>
+                <a:tc>
+                  <a:txBody>
+                    <a:bodyPr/>
+                    <a:lstStyle/>
+                    <a:p>
+                      <a:endParaRPr lang="en-US" sz="1400" dirty="0"/>
+                    </a:p>
+                  </a:txBody>
+                  <a:tcPr marL="74204" marR="74204" marT="37102" marB="37102"/>
+                </a:tc>
+                <a:tc>
+                  <a:txBody>
+                    <a:bodyPr/>
+                    <a:lstStyle/>
+                    <a:p>
+                      <a:endParaRPr lang="en-US" sz="1400" dirty="0"/>
+                    </a:p>
+                  </a:txBody>
+                  <a:tcPr marL="74204" marR="74204" marT="37102" marB="37102"/>
+                </a:tc>
+                <a:tc>
+                  <a:txBody>
+                    <a:bodyPr/>
+                    <a:lstStyle/>
+                    <a:p>
+                      <a:endParaRPr lang="en-US" sz="1400" dirty="0"/>
+                    </a:p>
+                  </a:txBody>
+                  <a:tcPr marL="74204" marR="74204" marT="37102" marB="37102"/>
+                </a:tc>
+                <a:extLst>
+                  <a:ext uri="{0D108BD9-81ED-4DB2-BD59-A6C34878D82A}">
+                    <a16:rowId xmlns:a16="http://schemas.microsoft.com/office/drawing/2014/main" val="974596321"/>
+                  </a:ext>
+                </a:extLst>
+              </a:tr>
+              <a:tr h="397899">
+                <a:tc>
+                  <a:txBody>
+                    <a:bodyPr/>
+                    <a:lstStyle/>
+                    <a:p>
+                      <a:r>
+                        <a:rPr lang="en-US" sz="1400" dirty="0"/>
+                        <a:t>4</a:t>
+                      </a:r>
+                    </a:p>
+                  </a:txBody>
+                  <a:tcPr marL="74204" marR="74204" marT="37102" marB="37102"/>
+                </a:tc>
+                <a:tc>
+                  <a:txBody>
+                    <a:bodyPr/>
+                    <a:lstStyle/>
+                    <a:p>
+                      <a:endParaRPr lang="en-US" sz="1400" dirty="0"/>
+                    </a:p>
+                  </a:txBody>
+                  <a:tcPr marL="74204" marR="74204" marT="37102" marB="37102"/>
+                </a:tc>
+                <a:tc>
+                  <a:txBody>
+                    <a:bodyPr/>
+                    <a:lstStyle/>
+                    <a:p>
+                      <a:endParaRPr lang="en-US" sz="1400" dirty="0"/>
+                    </a:p>
+                  </a:txBody>
+                  <a:tcPr marL="74204" marR="74204" marT="37102" marB="37102"/>
+                </a:tc>
+                <a:tc>
+                  <a:txBody>
+                    <a:bodyPr/>
+                    <a:lstStyle/>
+                    <a:p>
+                      <a:endParaRPr lang="en-US" sz="1400" dirty="0"/>
+                    </a:p>
+                  </a:txBody>
+                  <a:tcPr marL="74204" marR="74204" marT="37102" marB="37102"/>
+                </a:tc>
+                <a:tc>
+                  <a:txBody>
+                    <a:bodyPr/>
+                    <a:lstStyle/>
+                    <a:p>
+                      <a:endParaRPr lang="en-US" sz="1400" dirty="0"/>
+                    </a:p>
+                  </a:txBody>
+                  <a:tcPr marL="74204" marR="74204" marT="37102" marB="37102"/>
+                </a:tc>
+                <a:tc>
+                  <a:txBody>
+                    <a:bodyPr/>
+                    <a:lstStyle/>
+                    <a:p>
+                      <a:endParaRPr lang="en-US" sz="1400" dirty="0"/>
+                    </a:p>
+                  </a:txBody>
+                  <a:tcPr marL="74204" marR="74204" marT="37102" marB="37102"/>
+                </a:tc>
+                <a:extLst>
+                  <a:ext uri="{0D108BD9-81ED-4DB2-BD59-A6C34878D82A}">
+                    <a16:rowId xmlns:a16="http://schemas.microsoft.com/office/drawing/2014/main" val="2798937669"/>
+                  </a:ext>
+                </a:extLst>
+              </a:tr>
+            </a:tbl>
+          </a:graphicData>
+        </a:graphic>
+      </p:graphicFrame>
+      <mc:AlternateContent xmlns:mc="http://schemas.openxmlformats.org/markup-compatibility/2006">
+        <mc:Choice xmlns:a14="http://schemas.microsoft.com/office/drawing/2010/main" Requires="a14">
+          <p:graphicFrame>
+            <p:nvGraphicFramePr>
+              <p:cNvPr id="10" name="Table 9">
+                <a:extLst>
+                  <a:ext uri="{FF2B5EF4-FFF2-40B4-BE49-F238E27FC236}">
+                    <a16:creationId xmlns:a16="http://schemas.microsoft.com/office/drawing/2014/main" id="{F3271B12-B4DE-1E3F-EF20-EE940B17E660}"/>
+                  </a:ext>
+                </a:extLst>
+              </p:cNvPr>
+              <p:cNvGraphicFramePr>
+                <a:graphicFrameLocks noGrp="1"/>
+              </p:cNvGraphicFramePr>
+              <p:nvPr/>
+            </p:nvGraphicFramePr>
+            <p:xfrm>
+              <a:off x="10232043" y="2155634"/>
+              <a:ext cx="706784" cy="2160493"/>
+            </p:xfrm>
+            <a:graphic>
+              <a:graphicData uri="http://schemas.openxmlformats.org/drawingml/2006/table">
+                <a:tbl>
+                  <a:tblPr firstRow="1" bandRow="1">
+                    <a:tableStyleId>{5C22544A-7EE6-4342-B048-85BDC9FD1C3A}</a:tableStyleId>
+                  </a:tblPr>
+                  <a:tblGrid>
+                    <a:gridCol w="706784">
+                      <a:extLst>
+                        <a:ext uri="{9D8B030D-6E8A-4147-A177-3AD203B41FA5}">
+                          <a16:colId xmlns:a16="http://schemas.microsoft.com/office/drawing/2014/main" val="1361816447"/>
+                        </a:ext>
+                      </a:extLst>
+                    </a:gridCol>
+                  </a:tblGrid>
+                  <a:tr h="578669">
+                    <a:tc>
+                      <a:txBody>
+                        <a:bodyPr/>
+                        <a:lstStyle/>
+                        <a:p>
+                          <a:pPr/>
+                          <a14:m>
+                            <m:oMathPara xmlns:m="http://schemas.openxmlformats.org/officeDocument/2006/math">
+                              <m:oMathParaPr>
+                                <m:jc m:val="centerGroup"/>
+                              </m:oMathParaPr>
+                              <m:oMath xmlns:m="http://schemas.openxmlformats.org/officeDocument/2006/math">
+                                <m:acc>
+                                  <m:accPr>
+                                    <m:chr m:val="̂"/>
+                                    <m:ctrlPr>
+                                      <a:rPr lang="en-US" sz="3000" b="0" i="1" dirty="0" smtClean="0">
+                                        <a:latin typeface="Cambria Math" panose="02040503050406030204" pitchFamily="18" charset="0"/>
+                                      </a:rPr>
+                                    </m:ctrlPr>
+                                  </m:accPr>
+                                  <m:e>
+                                    <m:r>
+                                      <a:rPr lang="en-US" sz="3000" b="0" i="1" dirty="0" smtClean="0">
+                                        <a:latin typeface="Cambria Math" panose="02040503050406030204" pitchFamily="18" charset="0"/>
+                                      </a:rPr>
+                                      <m:t>𝑌</m:t>
+                                    </m:r>
+                                  </m:e>
+                                </m:acc>
+                              </m:oMath>
+                            </m:oMathPara>
+                          </a14:m>
+                          <a:endParaRPr lang="en-US" sz="1300" b="0" dirty="0"/>
+                        </a:p>
+                      </a:txBody>
+                      <a:tcPr marL="69535" marR="69535" marT="34767" marB="34767"/>
+                    </a:tc>
+                    <a:extLst>
+                      <a:ext uri="{0D108BD9-81ED-4DB2-BD59-A6C34878D82A}">
+                        <a16:rowId xmlns:a16="http://schemas.microsoft.com/office/drawing/2014/main" val="277695215"/>
+                      </a:ext>
+                    </a:extLst>
+                  </a:tr>
+                  <a:tr h="395456">
+                    <a:tc>
+                      <a:txBody>
+                        <a:bodyPr/>
+                        <a:lstStyle/>
+                        <a:p>
+                          <a:endParaRPr lang="en-US" sz="1300" dirty="0"/>
+                        </a:p>
+                      </a:txBody>
+                      <a:tcPr marL="69535" marR="69535" marT="34767" marB="34767"/>
+                    </a:tc>
+                    <a:extLst>
+                      <a:ext uri="{0D108BD9-81ED-4DB2-BD59-A6C34878D82A}">
+                        <a16:rowId xmlns:a16="http://schemas.microsoft.com/office/drawing/2014/main" val="2162110496"/>
+                      </a:ext>
+                    </a:extLst>
+                  </a:tr>
+                  <a:tr h="395456">
+                    <a:tc>
+                      <a:txBody>
+                        <a:bodyPr/>
+                        <a:lstStyle/>
+                        <a:p>
+                          <a:endParaRPr lang="en-US" sz="1300" dirty="0"/>
+                        </a:p>
+                      </a:txBody>
+                      <a:tcPr marL="69535" marR="69535" marT="34767" marB="34767"/>
+                    </a:tc>
+                    <a:extLst>
+                      <a:ext uri="{0D108BD9-81ED-4DB2-BD59-A6C34878D82A}">
+                        <a16:rowId xmlns:a16="http://schemas.microsoft.com/office/drawing/2014/main" val="3564268987"/>
+                      </a:ext>
+                    </a:extLst>
+                  </a:tr>
+                  <a:tr h="395456">
+                    <a:tc>
+                      <a:txBody>
+                        <a:bodyPr/>
+                        <a:lstStyle/>
+                        <a:p>
+                          <a:endParaRPr lang="en-US" sz="1300" dirty="0"/>
+                        </a:p>
+                      </a:txBody>
+                      <a:tcPr marL="69535" marR="69535" marT="34767" marB="34767"/>
+                    </a:tc>
+                    <a:extLst>
+                      <a:ext uri="{0D108BD9-81ED-4DB2-BD59-A6C34878D82A}">
+                        <a16:rowId xmlns:a16="http://schemas.microsoft.com/office/drawing/2014/main" val="1046935129"/>
+                      </a:ext>
+                    </a:extLst>
+                  </a:tr>
+                  <a:tr h="395456">
+                    <a:tc>
+                      <a:txBody>
+                        <a:bodyPr/>
+                        <a:lstStyle/>
+                        <a:p>
+                          <a:endParaRPr lang="en-US" sz="1300" dirty="0"/>
+                        </a:p>
+                      </a:txBody>
+                      <a:tcPr marL="69535" marR="69535" marT="34767" marB="34767"/>
+                    </a:tc>
+                    <a:extLst>
+                      <a:ext uri="{0D108BD9-81ED-4DB2-BD59-A6C34878D82A}">
+                        <a16:rowId xmlns:a16="http://schemas.microsoft.com/office/drawing/2014/main" val="3936094547"/>
+                      </a:ext>
+                    </a:extLst>
+                  </a:tr>
+                </a:tbl>
+              </a:graphicData>
+            </a:graphic>
+          </p:graphicFrame>
+        </mc:Choice>
+        <mc:Fallback>
+          <p:graphicFrame>
+            <p:nvGraphicFramePr>
+              <p:cNvPr id="10" name="Table 9">
+                <a:extLst>
+                  <a:ext uri="{FF2B5EF4-FFF2-40B4-BE49-F238E27FC236}">
+                    <a16:creationId xmlns:a16="http://schemas.microsoft.com/office/drawing/2014/main" id="{F3271B12-B4DE-1E3F-EF20-EE940B17E660}"/>
+                  </a:ext>
+                </a:extLst>
+              </p:cNvPr>
+              <p:cNvGraphicFramePr>
+                <a:graphicFrameLocks noGrp="1"/>
+              </p:cNvGraphicFramePr>
+              <p:nvPr/>
+            </p:nvGraphicFramePr>
+            <p:xfrm>
+              <a:off x="10232043" y="2155634"/>
+              <a:ext cx="706784" cy="2160493"/>
+            </p:xfrm>
+            <a:graphic>
+              <a:graphicData uri="http://schemas.openxmlformats.org/drawingml/2006/table">
+                <a:tbl>
+                  <a:tblPr firstRow="1" bandRow="1">
+                    <a:tableStyleId>{5C22544A-7EE6-4342-B048-85BDC9FD1C3A}</a:tableStyleId>
+                  </a:tblPr>
+                  <a:tblGrid>
+                    <a:gridCol w="706784">
+                      <a:extLst>
+                        <a:ext uri="{9D8B030D-6E8A-4147-A177-3AD203B41FA5}">
+                          <a16:colId xmlns:a16="http://schemas.microsoft.com/office/drawing/2014/main" val="1361816447"/>
+                        </a:ext>
+                      </a:extLst>
+                    </a:gridCol>
+                  </a:tblGrid>
+                  <a:tr h="578669">
+                    <a:tc>
+                      <a:txBody>
+                        <a:bodyPr/>
+                        <a:lstStyle/>
+                        <a:p>
+                          <a:endParaRPr lang="en-US"/>
+                        </a:p>
+                      </a:txBody>
+                      <a:tcPr marL="69535" marR="69535" marT="34767" marB="34767">
+                        <a:blipFill>
+                          <a:blip r:embed="rId2"/>
+                          <a:stretch>
+                            <a:fillRect l="-1754" t="-13043" r="-3509" b="-276087"/>
+                          </a:stretch>
+                        </a:blipFill>
+                      </a:tcPr>
+                    </a:tc>
+                    <a:extLst>
+                      <a:ext uri="{0D108BD9-81ED-4DB2-BD59-A6C34878D82A}">
+                        <a16:rowId xmlns:a16="http://schemas.microsoft.com/office/drawing/2014/main" val="277695215"/>
+                      </a:ext>
+                    </a:extLst>
+                  </a:tr>
+                  <a:tr h="395456">
+                    <a:tc>
+                      <a:txBody>
+                        <a:bodyPr/>
+                        <a:lstStyle/>
+                        <a:p>
+                          <a:endParaRPr lang="en-US" sz="1300" dirty="0"/>
+                        </a:p>
+                      </a:txBody>
+                      <a:tcPr marL="69535" marR="69535" marT="34767" marB="34767"/>
+                    </a:tc>
+                    <a:extLst>
+                      <a:ext uri="{0D108BD9-81ED-4DB2-BD59-A6C34878D82A}">
+                        <a16:rowId xmlns:a16="http://schemas.microsoft.com/office/drawing/2014/main" val="2162110496"/>
+                      </a:ext>
+                    </a:extLst>
+                  </a:tr>
+                  <a:tr h="395456">
+                    <a:tc>
+                      <a:txBody>
+                        <a:bodyPr/>
+                        <a:lstStyle/>
+                        <a:p>
+                          <a:endParaRPr lang="en-US" sz="1300" dirty="0"/>
+                        </a:p>
+                      </a:txBody>
+                      <a:tcPr marL="69535" marR="69535" marT="34767" marB="34767"/>
+                    </a:tc>
+                    <a:extLst>
+                      <a:ext uri="{0D108BD9-81ED-4DB2-BD59-A6C34878D82A}">
+                        <a16:rowId xmlns:a16="http://schemas.microsoft.com/office/drawing/2014/main" val="3564268987"/>
+                      </a:ext>
+                    </a:extLst>
+                  </a:tr>
+                  <a:tr h="395456">
+                    <a:tc>
+                      <a:txBody>
+                        <a:bodyPr/>
+                        <a:lstStyle/>
+                        <a:p>
+                          <a:endParaRPr lang="en-US" sz="1300" dirty="0"/>
+                        </a:p>
+                      </a:txBody>
+                      <a:tcPr marL="69535" marR="69535" marT="34767" marB="34767"/>
+                    </a:tc>
+                    <a:extLst>
+                      <a:ext uri="{0D108BD9-81ED-4DB2-BD59-A6C34878D82A}">
+                        <a16:rowId xmlns:a16="http://schemas.microsoft.com/office/drawing/2014/main" val="1046935129"/>
+                      </a:ext>
+                    </a:extLst>
+                  </a:tr>
+                  <a:tr h="395456">
+                    <a:tc>
+                      <a:txBody>
+                        <a:bodyPr/>
+                        <a:lstStyle/>
+                        <a:p>
+                          <a:endParaRPr lang="en-US" sz="1300" dirty="0"/>
+                        </a:p>
+                      </a:txBody>
+                      <a:tcPr marL="69535" marR="69535" marT="34767" marB="34767"/>
+                    </a:tc>
+                    <a:extLst>
+                      <a:ext uri="{0D108BD9-81ED-4DB2-BD59-A6C34878D82A}">
+                        <a16:rowId xmlns:a16="http://schemas.microsoft.com/office/drawing/2014/main" val="3936094547"/>
+                      </a:ext>
+                    </a:extLst>
+                  </a:tr>
+                </a:tbl>
+              </a:graphicData>
+            </a:graphic>
+          </p:graphicFrame>
+        </mc:Fallback>
+      </mc:AlternateContent>
+      <p:cxnSp>
+        <p:nvCxnSpPr>
+          <p:cNvPr id="22" name="Straight Arrow Connector 21">
+            <a:extLst>
+              <a:ext uri="{FF2B5EF4-FFF2-40B4-BE49-F238E27FC236}">
+                <a16:creationId xmlns:a16="http://schemas.microsoft.com/office/drawing/2014/main" id="{FEA22E17-5D11-72FA-3378-E37F49BBC2CD}"/>
+              </a:ext>
+            </a:extLst>
+          </p:cNvPr>
+          <p:cNvCxnSpPr>
+            <a:cxnSpLocks/>
+          </p:cNvCxnSpPr>
+          <p:nvPr/>
+        </p:nvCxnSpPr>
+        <p:spPr>
+          <a:xfrm>
+            <a:off x="5505757" y="3429000"/>
+            <a:ext cx="972976" cy="0"/>
+          </a:xfrm>
+          <a:prstGeom prst="straightConnector1">
+            <a:avLst/>
+          </a:prstGeom>
+          <a:ln w="190500">
+            <a:tailEnd type="triangle"/>
+          </a:ln>
+        </p:spPr>
+        <p:style>
+          <a:lnRef idx="1">
+            <a:schemeClr val="accent1"/>
+          </a:lnRef>
+          <a:fillRef idx="0">
+            <a:schemeClr val="accent1"/>
+          </a:fillRef>
+          <a:effectRef idx="0">
+            <a:schemeClr val="accent1"/>
+          </a:effectRef>
+          <a:fontRef idx="minor">
+            <a:schemeClr val="tx1"/>
+          </a:fontRef>
+        </p:style>
+      </p:cxnSp>
+      <p:cxnSp>
+        <p:nvCxnSpPr>
+          <p:cNvPr id="24" name="Straight Arrow Connector 23">
+            <a:extLst>
+              <a:ext uri="{FF2B5EF4-FFF2-40B4-BE49-F238E27FC236}">
+                <a16:creationId xmlns:a16="http://schemas.microsoft.com/office/drawing/2014/main" id="{FAB7B77B-EE0B-E356-7774-AE464A292DE9}"/>
+              </a:ext>
+            </a:extLst>
+          </p:cNvPr>
+          <p:cNvCxnSpPr>
+            <a:cxnSpLocks/>
+          </p:cNvCxnSpPr>
+          <p:nvPr/>
+        </p:nvCxnSpPr>
+        <p:spPr>
+          <a:xfrm>
+            <a:off x="9200184" y="3429000"/>
+            <a:ext cx="972976" cy="0"/>
+          </a:xfrm>
+          <a:prstGeom prst="straightConnector1">
+            <a:avLst/>
+          </a:prstGeom>
+          <a:ln w="190500">
+            <a:tailEnd type="triangle"/>
+          </a:ln>
+        </p:spPr>
+        <p:style>
+          <a:lnRef idx="1">
+            <a:schemeClr val="accent1"/>
+          </a:lnRef>
+          <a:fillRef idx="0">
+            <a:schemeClr val="accent1"/>
+          </a:fillRef>
+          <a:effectRef idx="0">
+            <a:schemeClr val="accent1"/>
+          </a:effectRef>
+          <a:fontRef idx="minor">
+            <a:schemeClr val="tx1"/>
+          </a:fontRef>
+        </p:style>
+      </p:cxnSp>
+      <p:pic>
+        <p:nvPicPr>
+          <p:cNvPr id="6" name="Graphic 5" descr="Packing Box Open outline">
+            <a:extLst>
+              <a:ext uri="{FF2B5EF4-FFF2-40B4-BE49-F238E27FC236}">
+                <a16:creationId xmlns:a16="http://schemas.microsoft.com/office/drawing/2014/main" id="{6535139D-4104-7A17-13CB-64A72501AA70}"/>
+              </a:ext>
+            </a:extLst>
+          </p:cNvPr>
+          <p:cNvPicPr>
+            <a:picLocks noChangeAspect="1"/>
+          </p:cNvPicPr>
+          <p:nvPr/>
+        </p:nvPicPr>
+        <p:blipFill>
+          <a:blip r:embed="rId3">
+            <a:extLst>
+              <a:ext uri="{96DAC541-7B7A-43D3-8B79-37D633B846F1}">
+                <asvg:svgBlip xmlns:asvg="http://schemas.microsoft.com/office/drawing/2016/SVG/main" r:embed="rId4"/>
+              </a:ext>
+            </a:extLst>
+          </a:blip>
+          <a:stretch>
+            <a:fillRect/>
+          </a:stretch>
+        </p:blipFill>
+        <p:spPr>
+          <a:xfrm>
+            <a:off x="6096000" y="1253519"/>
+            <a:ext cx="3588583" cy="3588583"/>
+          </a:xfrm>
+          <a:prstGeom prst="rect">
+            <a:avLst/>
+          </a:prstGeom>
+        </p:spPr>
+      </p:pic>
+      <p:pic>
+        <p:nvPicPr>
+          <p:cNvPr id="7" name="Graphic 6" descr="Forest scene with solid fill">
+            <a:extLst>
+              <a:ext uri="{FF2B5EF4-FFF2-40B4-BE49-F238E27FC236}">
+                <a16:creationId xmlns:a16="http://schemas.microsoft.com/office/drawing/2014/main" id="{010830FE-A64C-E804-5E36-576CBAE2EE78}"/>
+              </a:ext>
+            </a:extLst>
+          </p:cNvPr>
+          <p:cNvPicPr>
+            <a:picLocks noChangeAspect="1"/>
+          </p:cNvPicPr>
+          <p:nvPr/>
+        </p:nvPicPr>
+        <p:blipFill>
+          <a:blip r:embed="rId5">
+            <a:extLst>
+              <a:ext uri="{96DAC541-7B7A-43D3-8B79-37D633B846F1}">
+                <asvg:svgBlip xmlns:asvg="http://schemas.microsoft.com/office/drawing/2016/SVG/main" r:embed="rId6"/>
+              </a:ext>
+            </a:extLst>
+          </a:blip>
+          <a:stretch>
+            <a:fillRect/>
+          </a:stretch>
+        </p:blipFill>
+        <p:spPr>
+          <a:xfrm>
+            <a:off x="6782058" y="797859"/>
+            <a:ext cx="2160494" cy="2160494"/>
+          </a:xfrm>
+          <a:prstGeom prst="rect">
+            <a:avLst/>
+          </a:prstGeom>
+        </p:spPr>
+      </p:pic>
+    </p:spTree>
+    <p:extLst>
+      <p:ext uri="{BB962C8B-B14F-4D97-AF65-F5344CB8AC3E}">
+        <p14:creationId xmlns:p14="http://schemas.microsoft.com/office/powerpoint/2010/main" val="2091059046"/>
+      </p:ext>
+    </p:extLst>
+  </p:cSld>
+  <p:clrMapOvr>
+    <a:masterClrMapping/>
+  </p:clrMapOvr>
+</p:sld>
+</file>
+
 <file path=ppt/theme/theme1.xml><?xml version="1.0" encoding="utf-8"?>
 <a:theme xmlns:a="http://schemas.openxmlformats.org/drawingml/2006/main" name="Office Theme">
   <a:themeElements>

</xml_diff>